<commit_message>
trying to explain PCA
</commit_message>
<xml_diff>
--- a/Week_8/PCA_intro.pptx
+++ b/Week_8/PCA_intro.pptx
@@ -11,7 +11,6 @@
     <p:sldId id="259" r:id="rId5"/>
     <p:sldId id="260" r:id="rId6"/>
     <p:sldId id="261" r:id="rId7"/>
-    <p:sldId id="262" r:id="rId8"/>
   </p:sldIdLst>
   <p:sldSz cx="12192000" cy="6858000"/>
   <p:notesSz cx="6858000" cy="9144000"/>
@@ -207,6 +206,92 @@
       </pc:sldChg>
     </pc:docChg>
   </pc:docChgLst>
+  <pc:docChgLst>
+    <pc:chgData name="Catherine Kidner" userId="05772faa-c547-42bd-a4f8-01ff9d39ffcc" providerId="ADAL" clId="{A545CE41-C903-1340-8858-B281EBB3D597}"/>
+    <pc:docChg chg="custSel addSld delSld modSld">
+      <pc:chgData name="Catherine Kidner" userId="05772faa-c547-42bd-a4f8-01ff9d39ffcc" providerId="ADAL" clId="{A545CE41-C903-1340-8858-B281EBB3D597}" dt="2023-02-21T16:29:37.980" v="62" actId="20577"/>
+      <pc:docMkLst>
+        <pc:docMk/>
+      </pc:docMkLst>
+      <pc:sldChg chg="delSp modSp del">
+        <pc:chgData name="Catherine Kidner" userId="05772faa-c547-42bd-a4f8-01ff9d39ffcc" providerId="ADAL" clId="{A545CE41-C903-1340-8858-B281EBB3D597}" dt="2023-02-21T15:20:51.888" v="2" actId="2696"/>
+        <pc:sldMkLst>
+          <pc:docMk/>
+          <pc:sldMk cId="543129939" sldId="261"/>
+        </pc:sldMkLst>
+        <pc:picChg chg="del mod">
+          <ac:chgData name="Catherine Kidner" userId="05772faa-c547-42bd-a4f8-01ff9d39ffcc" providerId="ADAL" clId="{A545CE41-C903-1340-8858-B281EBB3D597}" dt="2023-02-21T15:20:34.575" v="1" actId="478"/>
+          <ac:picMkLst>
+            <pc:docMk/>
+            <pc:sldMk cId="543129939" sldId="261"/>
+            <ac:picMk id="1026" creationId="{2806B3EF-2735-BAE7-931C-96C64196D0B0}"/>
+          </ac:picMkLst>
+        </pc:picChg>
+      </pc:sldChg>
+      <pc:sldChg chg="addSp delSp modSp new mod">
+        <pc:chgData name="Catherine Kidner" userId="05772faa-c547-42bd-a4f8-01ff9d39ffcc" providerId="ADAL" clId="{A545CE41-C903-1340-8858-B281EBB3D597}" dt="2023-02-21T16:29:37.980" v="62" actId="20577"/>
+        <pc:sldMkLst>
+          <pc:docMk/>
+          <pc:sldMk cId="879781716" sldId="261"/>
+        </pc:sldMkLst>
+        <pc:spChg chg="del">
+          <ac:chgData name="Catherine Kidner" userId="05772faa-c547-42bd-a4f8-01ff9d39ffcc" providerId="ADAL" clId="{A545CE41-C903-1340-8858-B281EBB3D597}" dt="2023-02-21T16:27:47.268" v="6" actId="478"/>
+          <ac:spMkLst>
+            <pc:docMk/>
+            <pc:sldMk cId="879781716" sldId="261"/>
+            <ac:spMk id="2" creationId="{5898CE1A-74D6-D391-D620-63AB1FA51C12}"/>
+          </ac:spMkLst>
+        </pc:spChg>
+        <pc:spChg chg="del">
+          <ac:chgData name="Catherine Kidner" userId="05772faa-c547-42bd-a4f8-01ff9d39ffcc" providerId="ADAL" clId="{A545CE41-C903-1340-8858-B281EBB3D597}" dt="2023-02-21T16:27:45.249" v="5" actId="478"/>
+          <ac:spMkLst>
+            <pc:docMk/>
+            <pc:sldMk cId="879781716" sldId="261"/>
+            <ac:spMk id="3" creationId="{F135214A-B6D5-AE15-71B2-15C933F44926}"/>
+          </ac:spMkLst>
+        </pc:spChg>
+        <pc:spChg chg="add mod">
+          <ac:chgData name="Catherine Kidner" userId="05772faa-c547-42bd-a4f8-01ff9d39ffcc" providerId="ADAL" clId="{A545CE41-C903-1340-8858-B281EBB3D597}" dt="2023-02-21T16:29:21.776" v="34" actId="113"/>
+          <ac:spMkLst>
+            <pc:docMk/>
+            <pc:sldMk cId="879781716" sldId="261"/>
+            <ac:spMk id="4" creationId="{055AA28D-80D9-A602-AB24-AC3FBD5DB3BE}"/>
+          </ac:spMkLst>
+        </pc:spChg>
+        <pc:spChg chg="add mod">
+          <ac:chgData name="Catherine Kidner" userId="05772faa-c547-42bd-a4f8-01ff9d39ffcc" providerId="ADAL" clId="{A545CE41-C903-1340-8858-B281EBB3D597}" dt="2023-02-21T16:29:37.980" v="62" actId="20577"/>
+          <ac:spMkLst>
+            <pc:docMk/>
+            <pc:sldMk cId="879781716" sldId="261"/>
+            <ac:spMk id="5" creationId="{5CBAC383-F1F9-B258-EFDB-497B631C5E0D}"/>
+          </ac:spMkLst>
+        </pc:spChg>
+        <pc:picChg chg="add mod">
+          <ac:chgData name="Catherine Kidner" userId="05772faa-c547-42bd-a4f8-01ff9d39ffcc" providerId="ADAL" clId="{A545CE41-C903-1340-8858-B281EBB3D597}" dt="2023-02-21T16:28:32.900" v="16" actId="1076"/>
+          <ac:picMkLst>
+            <pc:docMk/>
+            <pc:sldMk cId="879781716" sldId="261"/>
+            <ac:picMk id="1026" creationId="{6FD658AD-7CAC-8D8F-67B5-643341B3C183}"/>
+          </ac:picMkLst>
+        </pc:picChg>
+        <pc:picChg chg="add mod">
+          <ac:chgData name="Catherine Kidner" userId="05772faa-c547-42bd-a4f8-01ff9d39ffcc" providerId="ADAL" clId="{A545CE41-C903-1340-8858-B281EBB3D597}" dt="2023-02-21T16:28:36.550" v="17" actId="1076"/>
+          <ac:picMkLst>
+            <pc:docMk/>
+            <pc:sldMk cId="879781716" sldId="261"/>
+            <ac:picMk id="1028" creationId="{F5187455-6BF6-3021-459A-DF2A59769923}"/>
+          </ac:picMkLst>
+        </pc:picChg>
+      </pc:sldChg>
+      <pc:sldChg chg="del">
+        <pc:chgData name="Catherine Kidner" userId="05772faa-c547-42bd-a4f8-01ff9d39ffcc" providerId="ADAL" clId="{A545CE41-C903-1340-8858-B281EBB3D597}" dt="2023-02-21T15:20:53.245" v="3" actId="2696"/>
+        <pc:sldMkLst>
+          <pc:docMk/>
+          <pc:sldMk cId="1682133358" sldId="262"/>
+        </pc:sldMkLst>
+      </pc:sldChg>
+    </pc:docChg>
+  </pc:docChgLst>
 </pc:chgInfo>
 </file>
 
@@ -359,7 +444,7 @@
           <a:p>
             <a:fld id="{7DA1B0A3-4A4D-6D47-B6CD-C75BB54CAF56}" type="datetimeFigureOut">
               <a:rPr lang="en-US" smtClean="0"/>
-              <a:t>12/12/22</a:t>
+              <a:t>2/21/23</a:t>
             </a:fld>
             <a:endParaRPr lang="en-US"/>
           </a:p>
@@ -559,7 +644,7 @@
           <a:p>
             <a:fld id="{7DA1B0A3-4A4D-6D47-B6CD-C75BB54CAF56}" type="datetimeFigureOut">
               <a:rPr lang="en-US" smtClean="0"/>
-              <a:t>12/12/22</a:t>
+              <a:t>2/21/23</a:t>
             </a:fld>
             <a:endParaRPr lang="en-US"/>
           </a:p>
@@ -769,7 +854,7 @@
           <a:p>
             <a:fld id="{7DA1B0A3-4A4D-6D47-B6CD-C75BB54CAF56}" type="datetimeFigureOut">
               <a:rPr lang="en-US" smtClean="0"/>
-              <a:t>12/12/22</a:t>
+              <a:t>2/21/23</a:t>
             </a:fld>
             <a:endParaRPr lang="en-US"/>
           </a:p>
@@ -969,7 +1054,7 @@
           <a:p>
             <a:fld id="{7DA1B0A3-4A4D-6D47-B6CD-C75BB54CAF56}" type="datetimeFigureOut">
               <a:rPr lang="en-US" smtClean="0"/>
-              <a:t>12/12/22</a:t>
+              <a:t>2/21/23</a:t>
             </a:fld>
             <a:endParaRPr lang="en-US"/>
           </a:p>
@@ -1245,7 +1330,7 @@
           <a:p>
             <a:fld id="{7DA1B0A3-4A4D-6D47-B6CD-C75BB54CAF56}" type="datetimeFigureOut">
               <a:rPr lang="en-US" smtClean="0"/>
-              <a:t>12/12/22</a:t>
+              <a:t>2/21/23</a:t>
             </a:fld>
             <a:endParaRPr lang="en-US"/>
           </a:p>
@@ -1513,7 +1598,7 @@
           <a:p>
             <a:fld id="{7DA1B0A3-4A4D-6D47-B6CD-C75BB54CAF56}" type="datetimeFigureOut">
               <a:rPr lang="en-US" smtClean="0"/>
-              <a:t>12/12/22</a:t>
+              <a:t>2/21/23</a:t>
             </a:fld>
             <a:endParaRPr lang="en-US"/>
           </a:p>
@@ -1928,7 +2013,7 @@
           <a:p>
             <a:fld id="{7DA1B0A3-4A4D-6D47-B6CD-C75BB54CAF56}" type="datetimeFigureOut">
               <a:rPr lang="en-US" smtClean="0"/>
-              <a:t>12/12/22</a:t>
+              <a:t>2/21/23</a:t>
             </a:fld>
             <a:endParaRPr lang="en-US"/>
           </a:p>
@@ -2070,7 +2155,7 @@
           <a:p>
             <a:fld id="{7DA1B0A3-4A4D-6D47-B6CD-C75BB54CAF56}" type="datetimeFigureOut">
               <a:rPr lang="en-US" smtClean="0"/>
-              <a:t>12/12/22</a:t>
+              <a:t>2/21/23</a:t>
             </a:fld>
             <a:endParaRPr lang="en-US"/>
           </a:p>
@@ -2183,7 +2268,7 @@
           <a:p>
             <a:fld id="{7DA1B0A3-4A4D-6D47-B6CD-C75BB54CAF56}" type="datetimeFigureOut">
               <a:rPr lang="en-US" smtClean="0"/>
-              <a:t>12/12/22</a:t>
+              <a:t>2/21/23</a:t>
             </a:fld>
             <a:endParaRPr lang="en-US"/>
           </a:p>
@@ -2496,7 +2581,7 @@
           <a:p>
             <a:fld id="{7DA1B0A3-4A4D-6D47-B6CD-C75BB54CAF56}" type="datetimeFigureOut">
               <a:rPr lang="en-US" smtClean="0"/>
-              <a:t>12/12/22</a:t>
+              <a:t>2/21/23</a:t>
             </a:fld>
             <a:endParaRPr lang="en-US"/>
           </a:p>
@@ -2785,7 +2870,7 @@
           <a:p>
             <a:fld id="{7DA1B0A3-4A4D-6D47-B6CD-C75BB54CAF56}" type="datetimeFigureOut">
               <a:rPr lang="en-US" smtClean="0"/>
-              <a:t>12/12/22</a:t>
+              <a:t>2/21/23</a:t>
             </a:fld>
             <a:endParaRPr lang="en-US"/>
           </a:p>
@@ -3028,7 +3113,7 @@
           <a:p>
             <a:fld id="{7DA1B0A3-4A4D-6D47-B6CD-C75BB54CAF56}" type="datetimeFigureOut">
               <a:rPr lang="en-US" smtClean="0"/>
-              <a:t>12/12/22</a:t>
+              <a:t>2/21/23</a:t>
             </a:fld>
             <a:endParaRPr lang="en-US"/>
           </a:p>
@@ -4752,47 +4837,12 @@
           <a:chExt cx="0" cy="0"/>
         </a:xfrm>
       </p:grpSpPr>
-      <p:sp>
-        <p:nvSpPr>
-          <p:cNvPr id="4" name="TextBox 3">
-            <a:extLst>
-              <a:ext uri="{FF2B5EF4-FFF2-40B4-BE49-F238E27FC236}">
-                <a16:creationId xmlns:a16="http://schemas.microsoft.com/office/drawing/2014/main" id="{209967E0-5DF2-C3D5-0969-3BCFC5A7F7C0}"/>
-              </a:ext>
-            </a:extLst>
-          </p:cNvPr>
-          <p:cNvSpPr txBox="1"/>
-          <p:nvPr/>
-        </p:nvSpPr>
-        <p:spPr>
-          <a:xfrm>
-            <a:off x="1028700" y="600075"/>
-            <a:ext cx="4063741" cy="369332"/>
-          </a:xfrm>
-          <a:prstGeom prst="rect">
-            <a:avLst/>
-          </a:prstGeom>
-          <a:noFill/>
-        </p:spPr>
-        <p:txBody>
-          <a:bodyPr wrap="none" rtlCol="0">
-            <a:spAutoFit/>
-          </a:bodyPr>
-          <a:lstStyle/>
-          <a:p>
-            <a:r>
-              <a:rPr lang="en-US" b="1" dirty="0"/>
-              <a:t>Plotting the data on the new dimensions</a:t>
-            </a:r>
-          </a:p>
-        </p:txBody>
-      </p:sp>
       <p:pic>
         <p:nvPicPr>
-          <p:cNvPr id="1026" name="Picture 2" descr="Principal Component Analysis (PCA) Explained Visually with Zero Math | by  Casey Cheng | Towards Data Science">
-            <a:extLst>
-              <a:ext uri="{FF2B5EF4-FFF2-40B4-BE49-F238E27FC236}">
-                <a16:creationId xmlns:a16="http://schemas.microsoft.com/office/drawing/2014/main" id="{2806B3EF-2735-BAE7-931C-96C64196D0B0}"/>
+          <p:cNvPr id="1026" name="Picture 2">
+            <a:extLst>
+              <a:ext uri="{FF2B5EF4-FFF2-40B4-BE49-F238E27FC236}">
+                <a16:creationId xmlns:a16="http://schemas.microsoft.com/office/drawing/2014/main" id="{6FD658AD-7CAC-8D8F-67B5-643341B3C183}"/>
               </a:ext>
             </a:extLst>
           </p:cNvPr>
@@ -4816,8 +4866,8 @@
         </p:blipFill>
         <p:spPr bwMode="auto">
           <a:xfrm>
-            <a:off x="4726237" y="1702040"/>
-            <a:ext cx="6101814" cy="4555885"/>
+            <a:off x="6441544" y="1231900"/>
+            <a:ext cx="5212451" cy="5219700"/>
           </a:xfrm>
           <a:prstGeom prst="rect">
             <a:avLst/>
@@ -4834,42 +4884,59 @@
           </a:extLst>
         </p:spPr>
       </p:pic>
-    </p:spTree>
-    <p:extLst>
-      <p:ext uri="{BB962C8B-B14F-4D97-AF65-F5344CB8AC3E}">
-        <p14:creationId xmlns:p14="http://schemas.microsoft.com/office/powerpoint/2010/main" val="543129939"/>
-      </p:ext>
-    </p:extLst>
-  </p:cSld>
-  <p:clrMapOvr>
-    <a:masterClrMapping/>
-  </p:clrMapOvr>
-</p:sld>
-</file>
-
-<file path=ppt/slides/slide7.xml><?xml version="1.0" encoding="utf-8"?>
-<p:sld xmlns:a="http://schemas.openxmlformats.org/drawingml/2006/main" xmlns:r="http://schemas.openxmlformats.org/officeDocument/2006/relationships" xmlns:p="http://schemas.openxmlformats.org/presentationml/2006/main">
-  <p:cSld>
-    <p:spTree>
-      <p:nvGrpSpPr>
-        <p:cNvPr id="1" name=""/>
-        <p:cNvGrpSpPr/>
-        <p:nvPr/>
-      </p:nvGrpSpPr>
-      <p:grpSpPr>
-        <a:xfrm>
-          <a:off x="0" y="0"/>
-          <a:ext cx="0" cy="0"/>
-          <a:chOff x="0" y="0"/>
-          <a:chExt cx="0" cy="0"/>
-        </a:xfrm>
-      </p:grpSpPr>
+      <p:pic>
+        <p:nvPicPr>
+          <p:cNvPr id="1028" name="Picture 4">
+            <a:extLst>
+              <a:ext uri="{FF2B5EF4-FFF2-40B4-BE49-F238E27FC236}">
+                <a16:creationId xmlns:a16="http://schemas.microsoft.com/office/drawing/2014/main" id="{F5187455-6BF6-3021-459A-DF2A59769923}"/>
+              </a:ext>
+            </a:extLst>
+          </p:cNvPr>
+          <p:cNvPicPr>
+            <a:picLocks noChangeAspect="1" noChangeArrowheads="1"/>
+          </p:cNvPicPr>
+          <p:nvPr/>
+        </p:nvPicPr>
+        <p:blipFill>
+          <a:blip r:embed="rId3">
+            <a:extLst>
+              <a:ext uri="{28A0092B-C50C-407E-A947-70E740481C1C}">
+                <a14:useLocalDpi xmlns:a14="http://schemas.microsoft.com/office/drawing/2010/main" val="0"/>
+              </a:ext>
+            </a:extLst>
+          </a:blip>
+          <a:srcRect/>
+          <a:stretch>
+            <a:fillRect/>
+          </a:stretch>
+        </p:blipFill>
+        <p:spPr bwMode="auto">
+          <a:xfrm>
+            <a:off x="782091" y="1130300"/>
+            <a:ext cx="5313909" cy="5321300"/>
+          </a:xfrm>
+          <a:prstGeom prst="rect">
+            <a:avLst/>
+          </a:prstGeom>
+          <a:noFill/>
+          <a:extLst>
+            <a:ext uri="{909E8E84-426E-40DD-AFC4-6F175D3DCCD1}">
+              <a14:hiddenFill xmlns:a14="http://schemas.microsoft.com/office/drawing/2010/main">
+                <a:solidFill>
+                  <a:srgbClr val="FFFFFF"/>
+                </a:solidFill>
+              </a14:hiddenFill>
+            </a:ext>
+          </a:extLst>
+        </p:spPr>
+      </p:pic>
       <p:sp>
         <p:nvSpPr>
           <p:cNvPr id="4" name="TextBox 3">
             <a:extLst>
               <a:ext uri="{FF2B5EF4-FFF2-40B4-BE49-F238E27FC236}">
-                <a16:creationId xmlns:a16="http://schemas.microsoft.com/office/drawing/2014/main" id="{082FD211-9A94-A096-61EA-82B87E4E4E39}"/>
+                <a16:creationId xmlns:a16="http://schemas.microsoft.com/office/drawing/2014/main" id="{055AA28D-80D9-A602-AB24-AC3FBD5DB3BE}"/>
               </a:ext>
             </a:extLst>
           </p:cNvPr>
@@ -4878,8 +4945,8 @@
         </p:nvSpPr>
         <p:spPr>
           <a:xfrm>
-            <a:off x="728663" y="600075"/>
-            <a:ext cx="4335203" cy="369332"/>
+            <a:off x="2552700" y="508000"/>
+            <a:ext cx="1438664" cy="369332"/>
           </a:xfrm>
           <a:prstGeom prst="rect">
             <a:avLst/>
@@ -4887,14 +4954,49 @@
           <a:noFill/>
         </p:spPr>
         <p:txBody>
-          <a:bodyPr wrap="square" rtlCol="0">
+          <a:bodyPr wrap="none" rtlCol="0">
             <a:spAutoFit/>
           </a:bodyPr>
           <a:lstStyle/>
           <a:p>
             <a:r>
               <a:rPr lang="en-US" b="1" dirty="0"/>
-              <a:t>Loadings</a:t>
+              <a:t>Original Data</a:t>
+            </a:r>
+          </a:p>
+        </p:txBody>
+      </p:sp>
+      <p:sp>
+        <p:nvSpPr>
+          <p:cNvPr id="5" name="TextBox 4">
+            <a:extLst>
+              <a:ext uri="{FF2B5EF4-FFF2-40B4-BE49-F238E27FC236}">
+                <a16:creationId xmlns:a16="http://schemas.microsoft.com/office/drawing/2014/main" id="{5CBAC383-F1F9-B258-EFDB-497B631C5E0D}"/>
+              </a:ext>
+            </a:extLst>
+          </p:cNvPr>
+          <p:cNvSpPr txBox="1"/>
+          <p:nvPr/>
+        </p:nvSpPr>
+        <p:spPr>
+          <a:xfrm>
+            <a:off x="8077200" y="464066"/>
+            <a:ext cx="2828467" cy="369332"/>
+          </a:xfrm>
+          <a:prstGeom prst="rect">
+            <a:avLst/>
+          </a:prstGeom>
+          <a:noFill/>
+        </p:spPr>
+        <p:txBody>
+          <a:bodyPr wrap="none" rtlCol="0">
+            <a:spAutoFit/>
+          </a:bodyPr>
+          <a:lstStyle/>
+          <a:p>
+            <a:r>
+              <a:rPr lang="en-US" b="1" dirty="0"/>
+              <a:t>Projected onto new PC axes</a:t>
             </a:r>
           </a:p>
         </p:txBody>
@@ -4902,7 +5004,7 @@
     </p:spTree>
     <p:extLst>
       <p:ext uri="{BB962C8B-B14F-4D97-AF65-F5344CB8AC3E}">
-        <p14:creationId xmlns:p14="http://schemas.microsoft.com/office/powerpoint/2010/main" val="1682133358"/>
+        <p14:creationId xmlns:p14="http://schemas.microsoft.com/office/powerpoint/2010/main" val="879781716"/>
       </p:ext>
     </p:extLst>
   </p:cSld>

</xml_diff>